<commit_message>
Updated Informe de Avance/2013-10-14-InformedeAvance.pptx
</commit_message>
<xml_diff>
--- a/docs/Reuniones/Sprint 3/Informe de Avance/2013-10-14-InformedeAvance.pptx
+++ b/docs/Reuniones/Sprint 3/Informe de Avance/2013-10-14-InformedeAvance.pptx
@@ -9,11 +9,15 @@
     <p:sldId id="259" r:id="rId3"/>
     <p:sldId id="260" r:id="rId4"/>
     <p:sldId id="261" r:id="rId5"/>
-    <p:sldId id="262" r:id="rId6"/>
-    <p:sldId id="267" r:id="rId7"/>
-    <p:sldId id="268" r:id="rId8"/>
-    <p:sldId id="269" r:id="rId9"/>
-    <p:sldId id="271" r:id="rId10"/>
+    <p:sldId id="267" r:id="rId6"/>
+    <p:sldId id="268" r:id="rId7"/>
+    <p:sldId id="269" r:id="rId8"/>
+    <p:sldId id="271" r:id="rId9"/>
+    <p:sldId id="272" r:id="rId10"/>
+    <p:sldId id="273" r:id="rId11"/>
+    <p:sldId id="274" r:id="rId12"/>
+    <p:sldId id="275" r:id="rId13"/>
+    <p:sldId id="276" r:id="rId14"/>
   </p:sldIdLst>
   <p:sldSz cx="12192000" cy="6858000"/>
   <p:notesSz cx="6858000" cy="9144000"/>
@@ -112,6 +116,22 @@
       </a:defRPr>
     </a:lvl9pPr>
   </p:defaultTextStyle>
+  <p:extLst>
+    <p:ext uri="{EFAFB233-063F-42B5-8137-9DF3F51BA10A}">
+      <p15:sldGuideLst xmlns:p15="http://schemas.microsoft.com/office/powerpoint/2012/main">
+        <p15:guide id="1" orient="horz" pos="2160">
+          <p15:clr>
+            <a:srgbClr val="A4A3A4"/>
+          </p15:clr>
+        </p15:guide>
+        <p15:guide id="2" pos="3840">
+          <p15:clr>
+            <a:srgbClr val="A4A3A4"/>
+          </p15:clr>
+        </p15:guide>
+      </p15:sldGuideLst>
+    </p:ext>
+  </p:extLst>
 </p:presentation>
 </file>
 
@@ -316,7 +336,7 @@
             <a:fld id="{B87542EE-7BFA-4B34-A569-1D90ACDA69CB}" type="datetimeFigureOut">
               <a:rPr lang="es-AR" smtClean="0"/>
               <a:pPr/>
-              <a:t>14/10/2013</a:t>
+              <a:t>15/10/2013</a:t>
             </a:fld>
             <a:endParaRPr lang="es-AR"/>
           </a:p>
@@ -379,7 +399,7 @@
             <a:fld id="{B5501149-5F35-409E-8668-7DEEED8F37B1}" type="slidenum">
               <a:rPr lang="es-AR" smtClean="0"/>
               <a:pPr/>
-              <a:t>‹Nº›</a:t>
+              <a:t>‹#›</a:t>
             </a:fld>
             <a:endParaRPr lang="es-AR"/>
           </a:p>
@@ -388,7 +408,7 @@
     </p:spTree>
     <p:extLst>
       <p:ext uri="{BB962C8B-B14F-4D97-AF65-F5344CB8AC3E}">
-        <p14:creationId xmlns="" xmlns:p14="http://schemas.microsoft.com/office/powerpoint/2010/main" val="2798060797"/>
+        <p14:creationId xmlns:p14="http://schemas.microsoft.com/office/powerpoint/2010/main" val="2798060797"/>
       </p:ext>
     </p:extLst>
   </p:cSld>
@@ -508,7 +528,7 @@
             <a:fld id="{B87542EE-7BFA-4B34-A569-1D90ACDA69CB}" type="datetimeFigureOut">
               <a:rPr lang="es-AR" smtClean="0"/>
               <a:pPr/>
-              <a:t>14/10/2013</a:t>
+              <a:t>15/10/2013</a:t>
             </a:fld>
             <a:endParaRPr lang="es-AR"/>
           </a:p>
@@ -551,7 +571,7 @@
             <a:fld id="{B5501149-5F35-409E-8668-7DEEED8F37B1}" type="slidenum">
               <a:rPr lang="es-AR" smtClean="0"/>
               <a:pPr/>
-              <a:t>‹Nº›</a:t>
+              <a:t>‹#›</a:t>
             </a:fld>
             <a:endParaRPr lang="es-AR"/>
           </a:p>
@@ -560,7 +580,7 @@
     </p:spTree>
     <p:extLst>
       <p:ext uri="{BB962C8B-B14F-4D97-AF65-F5344CB8AC3E}">
-        <p14:creationId xmlns="" xmlns:p14="http://schemas.microsoft.com/office/powerpoint/2010/main" val="1214076776"/>
+        <p14:creationId xmlns:p14="http://schemas.microsoft.com/office/powerpoint/2010/main" val="1214076776"/>
       </p:ext>
     </p:extLst>
   </p:cSld>
@@ -690,7 +710,7 @@
             <a:fld id="{B87542EE-7BFA-4B34-A569-1D90ACDA69CB}" type="datetimeFigureOut">
               <a:rPr lang="es-AR" smtClean="0"/>
               <a:pPr/>
-              <a:t>14/10/2013</a:t>
+              <a:t>15/10/2013</a:t>
             </a:fld>
             <a:endParaRPr lang="es-AR"/>
           </a:p>
@@ -733,7 +753,7 @@
             <a:fld id="{B5501149-5F35-409E-8668-7DEEED8F37B1}" type="slidenum">
               <a:rPr lang="es-AR" smtClean="0"/>
               <a:pPr/>
-              <a:t>‹Nº›</a:t>
+              <a:t>‹#›</a:t>
             </a:fld>
             <a:endParaRPr lang="es-AR"/>
           </a:p>
@@ -742,7 +762,7 @@
     </p:spTree>
     <p:extLst>
       <p:ext uri="{BB962C8B-B14F-4D97-AF65-F5344CB8AC3E}">
-        <p14:creationId xmlns="" xmlns:p14="http://schemas.microsoft.com/office/powerpoint/2010/main" val="3272606660"/>
+        <p14:creationId xmlns:p14="http://schemas.microsoft.com/office/powerpoint/2010/main" val="3272606660"/>
       </p:ext>
     </p:extLst>
   </p:cSld>
@@ -862,7 +882,7 @@
             <a:fld id="{B87542EE-7BFA-4B34-A569-1D90ACDA69CB}" type="datetimeFigureOut">
               <a:rPr lang="es-AR" smtClean="0"/>
               <a:pPr/>
-              <a:t>14/10/2013</a:t>
+              <a:t>15/10/2013</a:t>
             </a:fld>
             <a:endParaRPr lang="es-AR"/>
           </a:p>
@@ -905,7 +925,7 @@
             <a:fld id="{B5501149-5F35-409E-8668-7DEEED8F37B1}" type="slidenum">
               <a:rPr lang="es-AR" smtClean="0"/>
               <a:pPr/>
-              <a:t>‹Nº›</a:t>
+              <a:t>‹#›</a:t>
             </a:fld>
             <a:endParaRPr lang="es-AR"/>
           </a:p>
@@ -914,7 +934,7 @@
     </p:spTree>
     <p:extLst>
       <p:ext uri="{BB962C8B-B14F-4D97-AF65-F5344CB8AC3E}">
-        <p14:creationId xmlns="" xmlns:p14="http://schemas.microsoft.com/office/powerpoint/2010/main" val="3159030526"/>
+        <p14:creationId xmlns:p14="http://schemas.microsoft.com/office/powerpoint/2010/main" val="3159030526"/>
       </p:ext>
     </p:extLst>
   </p:cSld>
@@ -1120,7 +1140,7 @@
             <a:fld id="{B87542EE-7BFA-4B34-A569-1D90ACDA69CB}" type="datetimeFigureOut">
               <a:rPr lang="es-AR" smtClean="0"/>
               <a:pPr/>
-              <a:t>14/10/2013</a:t>
+              <a:t>15/10/2013</a:t>
             </a:fld>
             <a:endParaRPr lang="es-AR"/>
           </a:p>
@@ -1163,7 +1183,7 @@
             <a:fld id="{B5501149-5F35-409E-8668-7DEEED8F37B1}" type="slidenum">
               <a:rPr lang="es-AR" smtClean="0"/>
               <a:pPr/>
-              <a:t>‹Nº›</a:t>
+              <a:t>‹#›</a:t>
             </a:fld>
             <a:endParaRPr lang="es-AR"/>
           </a:p>
@@ -1172,7 +1192,7 @@
     </p:spTree>
     <p:extLst>
       <p:ext uri="{BB962C8B-B14F-4D97-AF65-F5344CB8AC3E}">
-        <p14:creationId xmlns="" xmlns:p14="http://schemas.microsoft.com/office/powerpoint/2010/main" val="1040550014"/>
+        <p14:creationId xmlns:p14="http://schemas.microsoft.com/office/powerpoint/2010/main" val="1040550014"/>
       </p:ext>
     </p:extLst>
   </p:cSld>
@@ -1410,7 +1430,7 @@
             <a:fld id="{B87542EE-7BFA-4B34-A569-1D90ACDA69CB}" type="datetimeFigureOut">
               <a:rPr lang="es-AR" smtClean="0"/>
               <a:pPr/>
-              <a:t>14/10/2013</a:t>
+              <a:t>15/10/2013</a:t>
             </a:fld>
             <a:endParaRPr lang="es-AR"/>
           </a:p>
@@ -1453,7 +1473,7 @@
             <a:fld id="{B5501149-5F35-409E-8668-7DEEED8F37B1}" type="slidenum">
               <a:rPr lang="es-AR" smtClean="0"/>
               <a:pPr/>
-              <a:t>‹Nº›</a:t>
+              <a:t>‹#›</a:t>
             </a:fld>
             <a:endParaRPr lang="es-AR"/>
           </a:p>
@@ -1462,7 +1482,7 @@
     </p:spTree>
     <p:extLst>
       <p:ext uri="{BB962C8B-B14F-4D97-AF65-F5344CB8AC3E}">
-        <p14:creationId xmlns="" xmlns:p14="http://schemas.microsoft.com/office/powerpoint/2010/main" val="3310126084"/>
+        <p14:creationId xmlns:p14="http://schemas.microsoft.com/office/powerpoint/2010/main" val="3310126084"/>
       </p:ext>
     </p:extLst>
   </p:cSld>
@@ -1850,7 +1870,7 @@
             <a:fld id="{B87542EE-7BFA-4B34-A569-1D90ACDA69CB}" type="datetimeFigureOut">
               <a:rPr lang="es-AR" smtClean="0"/>
               <a:pPr/>
-              <a:t>14/10/2013</a:t>
+              <a:t>15/10/2013</a:t>
             </a:fld>
             <a:endParaRPr lang="es-AR"/>
           </a:p>
@@ -1893,7 +1913,7 @@
             <a:fld id="{B5501149-5F35-409E-8668-7DEEED8F37B1}" type="slidenum">
               <a:rPr lang="es-AR" smtClean="0"/>
               <a:pPr/>
-              <a:t>‹Nº›</a:t>
+              <a:t>‹#›</a:t>
             </a:fld>
             <a:endParaRPr lang="es-AR"/>
           </a:p>
@@ -1902,7 +1922,7 @@
     </p:spTree>
     <p:extLst>
       <p:ext uri="{BB962C8B-B14F-4D97-AF65-F5344CB8AC3E}">
-        <p14:creationId xmlns="" xmlns:p14="http://schemas.microsoft.com/office/powerpoint/2010/main" val="477640528"/>
+        <p14:creationId xmlns:p14="http://schemas.microsoft.com/office/powerpoint/2010/main" val="477640528"/>
       </p:ext>
     </p:extLst>
   </p:cSld>
@@ -1970,7 +1990,7 @@
             <a:fld id="{B87542EE-7BFA-4B34-A569-1D90ACDA69CB}" type="datetimeFigureOut">
               <a:rPr lang="es-AR" smtClean="0"/>
               <a:pPr/>
-              <a:t>14/10/2013</a:t>
+              <a:t>15/10/2013</a:t>
             </a:fld>
             <a:endParaRPr lang="es-AR"/>
           </a:p>
@@ -2013,7 +2033,7 @@
             <a:fld id="{B5501149-5F35-409E-8668-7DEEED8F37B1}" type="slidenum">
               <a:rPr lang="es-AR" smtClean="0"/>
               <a:pPr/>
-              <a:t>‹Nº›</a:t>
+              <a:t>‹#›</a:t>
             </a:fld>
             <a:endParaRPr lang="es-AR"/>
           </a:p>
@@ -2022,7 +2042,7 @@
     </p:spTree>
     <p:extLst>
       <p:ext uri="{BB962C8B-B14F-4D97-AF65-F5344CB8AC3E}">
-        <p14:creationId xmlns="" xmlns:p14="http://schemas.microsoft.com/office/powerpoint/2010/main" val="3742494228"/>
+        <p14:creationId xmlns:p14="http://schemas.microsoft.com/office/powerpoint/2010/main" val="3742494228"/>
       </p:ext>
     </p:extLst>
   </p:cSld>
@@ -2067,7 +2087,7 @@
             <a:fld id="{B87542EE-7BFA-4B34-A569-1D90ACDA69CB}" type="datetimeFigureOut">
               <a:rPr lang="es-AR" smtClean="0"/>
               <a:pPr/>
-              <a:t>14/10/2013</a:t>
+              <a:t>15/10/2013</a:t>
             </a:fld>
             <a:endParaRPr lang="es-AR"/>
           </a:p>
@@ -2110,7 +2130,7 @@
             <a:fld id="{B5501149-5F35-409E-8668-7DEEED8F37B1}" type="slidenum">
               <a:rPr lang="es-AR" smtClean="0"/>
               <a:pPr/>
-              <a:t>‹Nº›</a:t>
+              <a:t>‹#›</a:t>
             </a:fld>
             <a:endParaRPr lang="es-AR"/>
           </a:p>
@@ -2119,7 +2139,7 @@
     </p:spTree>
     <p:extLst>
       <p:ext uri="{BB962C8B-B14F-4D97-AF65-F5344CB8AC3E}">
-        <p14:creationId xmlns="" xmlns:p14="http://schemas.microsoft.com/office/powerpoint/2010/main" val="846272648"/>
+        <p14:creationId xmlns:p14="http://schemas.microsoft.com/office/powerpoint/2010/main" val="846272648"/>
       </p:ext>
     </p:extLst>
   </p:cSld>
@@ -2425,7 +2445,7 @@
             <a:fld id="{B87542EE-7BFA-4B34-A569-1D90ACDA69CB}" type="datetimeFigureOut">
               <a:rPr lang="es-AR" smtClean="0"/>
               <a:pPr/>
-              <a:t>14/10/2013</a:t>
+              <a:t>15/10/2013</a:t>
             </a:fld>
             <a:endParaRPr lang="es-AR"/>
           </a:p>
@@ -2478,7 +2498,7 @@
             <a:fld id="{B5501149-5F35-409E-8668-7DEEED8F37B1}" type="slidenum">
               <a:rPr lang="es-AR" smtClean="0"/>
               <a:pPr/>
-              <a:t>‹Nº›</a:t>
+              <a:t>‹#›</a:t>
             </a:fld>
             <a:endParaRPr lang="es-AR"/>
           </a:p>
@@ -2487,7 +2507,7 @@
     </p:spTree>
     <p:extLst>
       <p:ext uri="{BB962C8B-B14F-4D97-AF65-F5344CB8AC3E}">
-        <p14:creationId xmlns="" xmlns:p14="http://schemas.microsoft.com/office/powerpoint/2010/main" val="2886582411"/>
+        <p14:creationId xmlns:p14="http://schemas.microsoft.com/office/powerpoint/2010/main" val="2886582411"/>
       </p:ext>
     </p:extLst>
   </p:cSld>
@@ -2743,7 +2763,7 @@
             <a:fld id="{B87542EE-7BFA-4B34-A569-1D90ACDA69CB}" type="datetimeFigureOut">
               <a:rPr lang="es-AR" smtClean="0"/>
               <a:pPr/>
-              <a:t>14/10/2013</a:t>
+              <a:t>15/10/2013</a:t>
             </a:fld>
             <a:endParaRPr lang="es-AR"/>
           </a:p>
@@ -2806,7 +2826,7 @@
             <a:fld id="{B5501149-5F35-409E-8668-7DEEED8F37B1}" type="slidenum">
               <a:rPr lang="es-AR" smtClean="0"/>
               <a:pPr/>
-              <a:t>‹Nº›</a:t>
+              <a:t>‹#›</a:t>
             </a:fld>
             <a:endParaRPr lang="es-AR"/>
           </a:p>
@@ -2815,7 +2835,7 @@
     </p:spTree>
     <p:extLst>
       <p:ext uri="{BB962C8B-B14F-4D97-AF65-F5344CB8AC3E}">
-        <p14:creationId xmlns="" xmlns:p14="http://schemas.microsoft.com/office/powerpoint/2010/main" val="1732184979"/>
+        <p14:creationId xmlns:p14="http://schemas.microsoft.com/office/powerpoint/2010/main" val="1732184979"/>
       </p:ext>
     </p:extLst>
   </p:cSld>
@@ -2978,7 +2998,7 @@
             <a:fld id="{B87542EE-7BFA-4B34-A569-1D90ACDA69CB}" type="datetimeFigureOut">
               <a:rPr lang="es-AR" smtClean="0"/>
               <a:pPr/>
-              <a:t>14/10/2013</a:t>
+              <a:t>15/10/2013</a:t>
             </a:fld>
             <a:endParaRPr lang="es-AR"/>
           </a:p>
@@ -3061,7 +3081,7 @@
             <a:fld id="{B5501149-5F35-409E-8668-7DEEED8F37B1}" type="slidenum">
               <a:rPr lang="es-AR" smtClean="0"/>
               <a:pPr/>
-              <a:t>‹Nº›</a:t>
+              <a:t>‹#›</a:t>
             </a:fld>
             <a:endParaRPr lang="es-AR"/>
           </a:p>
@@ -3070,7 +3090,7 @@
     </p:spTree>
     <p:extLst>
       <p:ext uri="{BB962C8B-B14F-4D97-AF65-F5344CB8AC3E}">
-        <p14:creationId xmlns="" xmlns:p14="http://schemas.microsoft.com/office/powerpoint/2010/main" val="2316853074"/>
+        <p14:creationId xmlns:p14="http://schemas.microsoft.com/office/powerpoint/2010/main" val="2316853074"/>
       </p:ext>
     </p:extLst>
   </p:cSld>
@@ -3585,7 +3605,415 @@
     </p:spTree>
     <p:extLst>
       <p:ext uri="{BB962C8B-B14F-4D97-AF65-F5344CB8AC3E}">
-        <p14:creationId xmlns="" xmlns:p14="http://schemas.microsoft.com/office/powerpoint/2010/main" val="3522218764"/>
+        <p14:creationId xmlns:p14="http://schemas.microsoft.com/office/powerpoint/2010/main" val="3522218764"/>
+      </p:ext>
+    </p:extLst>
+  </p:cSld>
+  <p:clrMapOvr>
+    <a:masterClrMapping/>
+  </p:clrMapOvr>
+  <p:timing>
+    <p:tnLst>
+      <p:par>
+        <p:cTn id="1" dur="indefinite" restart="never" nodeType="tmRoot"/>
+      </p:par>
+    </p:tnLst>
+  </p:timing>
+</p:sld>
+</file>
+
+<file path=ppt/slides/slide10.xml><?xml version="1.0" encoding="utf-8"?>
+<p:sld xmlns:a="http://schemas.openxmlformats.org/drawingml/2006/main" xmlns:r="http://schemas.openxmlformats.org/officeDocument/2006/relationships" xmlns:p="http://schemas.openxmlformats.org/presentationml/2006/main">
+  <p:cSld>
+    <p:spTree>
+      <p:nvGrpSpPr>
+        <p:cNvPr id="1" name=""/>
+        <p:cNvGrpSpPr/>
+        <p:nvPr/>
+      </p:nvGrpSpPr>
+      <p:grpSpPr>
+        <a:xfrm>
+          <a:off x="0" y="0"/>
+          <a:ext cx="0" cy="0"/>
+          <a:chOff x="0" y="0"/>
+          <a:chExt cx="0" cy="0"/>
+        </a:xfrm>
+      </p:grpSpPr>
+      <p:sp>
+        <p:nvSpPr>
+          <p:cNvPr id="2" name="1 Título"/>
+          <p:cNvSpPr>
+            <a:spLocks noGrp="1"/>
+          </p:cNvSpPr>
+          <p:nvPr>
+            <p:ph type="title"/>
+          </p:nvPr>
+        </p:nvSpPr>
+        <p:spPr>
+          <a:xfrm>
+            <a:off x="2024034" y="142852"/>
+            <a:ext cx="8229600" cy="1344203"/>
+          </a:xfrm>
+        </p:spPr>
+        <p:txBody>
+          <a:bodyPr>
+            <a:normAutofit/>
+          </a:bodyPr>
+          <a:lstStyle/>
+          <a:p>
+            <a:pPr algn="ctr"/>
+            <a:r>
+              <a:rPr lang="en-US" dirty="0" err="1" smtClean="0"/>
+              <a:t>Crear</a:t>
+            </a:r>
+            <a:r>
+              <a:rPr lang="en-US" dirty="0" smtClean="0"/>
+              <a:t> </a:t>
+            </a:r>
+            <a:r>
+              <a:rPr lang="en-US" dirty="0" err="1" smtClean="0"/>
+              <a:t>Funciones</a:t>
+            </a:r>
+            <a:endParaRPr lang="es-AR" sz="3600" i="1" dirty="0"/>
+          </a:p>
+        </p:txBody>
+      </p:sp>
+      <p:pic>
+        <p:nvPicPr>
+          <p:cNvPr id="4" name="Picture 3"/>
+          <p:cNvPicPr>
+            <a:picLocks noChangeAspect="1"/>
+          </p:cNvPicPr>
+          <p:nvPr/>
+        </p:nvPicPr>
+        <p:blipFill>
+          <a:blip r:embed="rId2"/>
+          <a:stretch>
+            <a:fillRect/>
+          </a:stretch>
+        </p:blipFill>
+        <p:spPr>
+          <a:xfrm>
+            <a:off x="1260690" y="1320372"/>
+            <a:ext cx="9428571" cy="5104762"/>
+          </a:xfrm>
+          <a:prstGeom prst="rect">
+            <a:avLst/>
+          </a:prstGeom>
+        </p:spPr>
+      </p:pic>
+    </p:spTree>
+    <p:extLst>
+      <p:ext uri="{BB962C8B-B14F-4D97-AF65-F5344CB8AC3E}">
+        <p14:creationId xmlns:p14="http://schemas.microsoft.com/office/powerpoint/2010/main" val="1837875593"/>
+      </p:ext>
+    </p:extLst>
+  </p:cSld>
+  <p:clrMapOvr>
+    <a:masterClrMapping/>
+  </p:clrMapOvr>
+  <p:timing>
+    <p:tnLst>
+      <p:par>
+        <p:cTn id="1" dur="indefinite" restart="never" nodeType="tmRoot"/>
+      </p:par>
+    </p:tnLst>
+  </p:timing>
+</p:sld>
+</file>
+
+<file path=ppt/slides/slide11.xml><?xml version="1.0" encoding="utf-8"?>
+<p:sld xmlns:a="http://schemas.openxmlformats.org/drawingml/2006/main" xmlns:r="http://schemas.openxmlformats.org/officeDocument/2006/relationships" xmlns:p="http://schemas.openxmlformats.org/presentationml/2006/main">
+  <p:cSld>
+    <p:spTree>
+      <p:nvGrpSpPr>
+        <p:cNvPr id="1" name=""/>
+        <p:cNvGrpSpPr/>
+        <p:nvPr/>
+      </p:nvGrpSpPr>
+      <p:grpSpPr>
+        <a:xfrm>
+          <a:off x="0" y="0"/>
+          <a:ext cx="0" cy="0"/>
+          <a:chOff x="0" y="0"/>
+          <a:chExt cx="0" cy="0"/>
+        </a:xfrm>
+      </p:grpSpPr>
+      <p:sp>
+        <p:nvSpPr>
+          <p:cNvPr id="2" name="1 Título"/>
+          <p:cNvSpPr>
+            <a:spLocks noGrp="1"/>
+          </p:cNvSpPr>
+          <p:nvPr>
+            <p:ph type="title"/>
+          </p:nvPr>
+        </p:nvSpPr>
+        <p:spPr>
+          <a:xfrm>
+            <a:off x="2024034" y="142852"/>
+            <a:ext cx="8229600" cy="1344203"/>
+          </a:xfrm>
+        </p:spPr>
+        <p:txBody>
+          <a:bodyPr>
+            <a:normAutofit/>
+          </a:bodyPr>
+          <a:lstStyle/>
+          <a:p>
+            <a:pPr algn="ctr"/>
+            <a:r>
+              <a:rPr lang="en-US" dirty="0" err="1" smtClean="0"/>
+              <a:t>Ver</a:t>
+            </a:r>
+            <a:r>
+              <a:rPr lang="en-US" dirty="0" smtClean="0"/>
+              <a:t> </a:t>
+            </a:r>
+            <a:r>
+              <a:rPr lang="en-US" dirty="0" err="1" smtClean="0"/>
+              <a:t>detalle</a:t>
+            </a:r>
+            <a:r>
+              <a:rPr lang="en-US" dirty="0" smtClean="0"/>
+              <a:t> de </a:t>
+            </a:r>
+            <a:r>
+              <a:rPr lang="en-US" dirty="0" err="1" smtClean="0"/>
+              <a:t>función</a:t>
+            </a:r>
+            <a:endParaRPr lang="es-AR" sz="3600" i="1" dirty="0"/>
+          </a:p>
+        </p:txBody>
+      </p:sp>
+      <p:pic>
+        <p:nvPicPr>
+          <p:cNvPr id="3" name="Picture 2"/>
+          <p:cNvPicPr>
+            <a:picLocks noChangeAspect="1"/>
+          </p:cNvPicPr>
+          <p:nvPr/>
+        </p:nvPicPr>
+        <p:blipFill>
+          <a:blip r:embed="rId2"/>
+          <a:stretch>
+            <a:fillRect/>
+          </a:stretch>
+        </p:blipFill>
+        <p:spPr>
+          <a:xfrm>
+            <a:off x="1491215" y="2081140"/>
+            <a:ext cx="9295238" cy="3314286"/>
+          </a:xfrm>
+          <a:prstGeom prst="rect">
+            <a:avLst/>
+          </a:prstGeom>
+        </p:spPr>
+      </p:pic>
+    </p:spTree>
+    <p:extLst>
+      <p:ext uri="{BB962C8B-B14F-4D97-AF65-F5344CB8AC3E}">
+        <p14:creationId xmlns:p14="http://schemas.microsoft.com/office/powerpoint/2010/main" val="1118929380"/>
+      </p:ext>
+    </p:extLst>
+  </p:cSld>
+  <p:clrMapOvr>
+    <a:masterClrMapping/>
+  </p:clrMapOvr>
+  <p:timing>
+    <p:tnLst>
+      <p:par>
+        <p:cTn id="1" dur="indefinite" restart="never" nodeType="tmRoot"/>
+      </p:par>
+    </p:tnLst>
+  </p:timing>
+</p:sld>
+</file>
+
+<file path=ppt/slides/slide12.xml><?xml version="1.0" encoding="utf-8"?>
+<p:sld xmlns:a="http://schemas.openxmlformats.org/drawingml/2006/main" xmlns:r="http://schemas.openxmlformats.org/officeDocument/2006/relationships" xmlns:p="http://schemas.openxmlformats.org/presentationml/2006/main">
+  <p:cSld>
+    <p:spTree>
+      <p:nvGrpSpPr>
+        <p:cNvPr id="1" name=""/>
+        <p:cNvGrpSpPr/>
+        <p:nvPr/>
+      </p:nvGrpSpPr>
+      <p:grpSpPr>
+        <a:xfrm>
+          <a:off x="0" y="0"/>
+          <a:ext cx="0" cy="0"/>
+          <a:chOff x="0" y="0"/>
+          <a:chExt cx="0" cy="0"/>
+        </a:xfrm>
+      </p:grpSpPr>
+      <p:sp>
+        <p:nvSpPr>
+          <p:cNvPr id="2" name="1 Título"/>
+          <p:cNvSpPr>
+            <a:spLocks noGrp="1"/>
+          </p:cNvSpPr>
+          <p:nvPr>
+            <p:ph type="title"/>
+          </p:nvPr>
+        </p:nvSpPr>
+        <p:spPr>
+          <a:xfrm>
+            <a:off x="2024034" y="142852"/>
+            <a:ext cx="8229600" cy="1344203"/>
+          </a:xfrm>
+        </p:spPr>
+        <p:txBody>
+          <a:bodyPr>
+            <a:normAutofit/>
+          </a:bodyPr>
+          <a:lstStyle/>
+          <a:p>
+            <a:pPr algn="ctr"/>
+            <a:r>
+              <a:rPr lang="en-US" dirty="0" err="1" smtClean="0"/>
+              <a:t>Listado</a:t>
+            </a:r>
+            <a:r>
+              <a:rPr lang="en-US" dirty="0" smtClean="0"/>
+              <a:t> de </a:t>
+            </a:r>
+            <a:r>
+              <a:rPr lang="en-US" dirty="0" err="1" smtClean="0"/>
+              <a:t>salas</a:t>
+            </a:r>
+            <a:endParaRPr lang="es-AR" sz="3600" i="1" dirty="0"/>
+          </a:p>
+        </p:txBody>
+      </p:sp>
+      <p:pic>
+        <p:nvPicPr>
+          <p:cNvPr id="5" name="Picture 4"/>
+          <p:cNvPicPr>
+            <a:picLocks noChangeAspect="1"/>
+          </p:cNvPicPr>
+          <p:nvPr/>
+        </p:nvPicPr>
+        <p:blipFill>
+          <a:blip r:embed="rId2"/>
+          <a:stretch>
+            <a:fillRect/>
+          </a:stretch>
+        </p:blipFill>
+        <p:spPr>
+          <a:xfrm>
+            <a:off x="1289262" y="1294586"/>
+            <a:ext cx="9371428" cy="4914286"/>
+          </a:xfrm>
+          <a:prstGeom prst="rect">
+            <a:avLst/>
+          </a:prstGeom>
+        </p:spPr>
+      </p:pic>
+    </p:spTree>
+    <p:extLst>
+      <p:ext uri="{BB962C8B-B14F-4D97-AF65-F5344CB8AC3E}">
+        <p14:creationId xmlns:p14="http://schemas.microsoft.com/office/powerpoint/2010/main" val="3363947416"/>
+      </p:ext>
+    </p:extLst>
+  </p:cSld>
+  <p:clrMapOvr>
+    <a:masterClrMapping/>
+  </p:clrMapOvr>
+  <p:timing>
+    <p:tnLst>
+      <p:par>
+        <p:cTn id="1" dur="indefinite" restart="never" nodeType="tmRoot"/>
+      </p:par>
+    </p:tnLst>
+  </p:timing>
+</p:sld>
+</file>
+
+<file path=ppt/slides/slide13.xml><?xml version="1.0" encoding="utf-8"?>
+<p:sld xmlns:a="http://schemas.openxmlformats.org/drawingml/2006/main" xmlns:r="http://schemas.openxmlformats.org/officeDocument/2006/relationships" xmlns:p="http://schemas.openxmlformats.org/presentationml/2006/main">
+  <p:cSld>
+    <p:spTree>
+      <p:nvGrpSpPr>
+        <p:cNvPr id="1" name=""/>
+        <p:cNvGrpSpPr/>
+        <p:nvPr/>
+      </p:nvGrpSpPr>
+      <p:grpSpPr>
+        <a:xfrm>
+          <a:off x="0" y="0"/>
+          <a:ext cx="0" cy="0"/>
+          <a:chOff x="0" y="0"/>
+          <a:chExt cx="0" cy="0"/>
+        </a:xfrm>
+      </p:grpSpPr>
+      <p:sp>
+        <p:nvSpPr>
+          <p:cNvPr id="2" name="1 Título"/>
+          <p:cNvSpPr>
+            <a:spLocks noGrp="1"/>
+          </p:cNvSpPr>
+          <p:nvPr>
+            <p:ph type="title"/>
+          </p:nvPr>
+        </p:nvSpPr>
+        <p:spPr>
+          <a:xfrm>
+            <a:off x="2024034" y="142852"/>
+            <a:ext cx="8229600" cy="1344203"/>
+          </a:xfrm>
+        </p:spPr>
+        <p:txBody>
+          <a:bodyPr>
+            <a:normAutofit/>
+          </a:bodyPr>
+          <a:lstStyle/>
+          <a:p>
+            <a:pPr algn="ctr"/>
+            <a:r>
+              <a:rPr lang="en-US" dirty="0" err="1" smtClean="0"/>
+              <a:t>Crear</a:t>
+            </a:r>
+            <a:r>
+              <a:rPr lang="en-US" dirty="0" smtClean="0"/>
+              <a:t> </a:t>
+            </a:r>
+            <a:r>
+              <a:rPr lang="en-US" dirty="0" err="1" smtClean="0"/>
+              <a:t>sala</a:t>
+            </a:r>
+            <a:endParaRPr lang="es-AR" sz="3600" i="1" dirty="0"/>
+          </a:p>
+        </p:txBody>
+      </p:sp>
+      <p:pic>
+        <p:nvPicPr>
+          <p:cNvPr id="3" name="Picture 2"/>
+          <p:cNvPicPr>
+            <a:picLocks noChangeAspect="1"/>
+          </p:cNvPicPr>
+          <p:nvPr/>
+        </p:nvPicPr>
+        <p:blipFill>
+          <a:blip r:embed="rId2"/>
+          <a:stretch>
+            <a:fillRect/>
+          </a:stretch>
+        </p:blipFill>
+        <p:spPr>
+          <a:xfrm>
+            <a:off x="1320350" y="1227081"/>
+            <a:ext cx="9228571" cy="5076190"/>
+          </a:xfrm>
+          <a:prstGeom prst="rect">
+            <a:avLst/>
+          </a:prstGeom>
+        </p:spPr>
+      </p:pic>
+    </p:spTree>
+    <p:extLst>
+      <p:ext uri="{BB962C8B-B14F-4D97-AF65-F5344CB8AC3E}">
+        <p14:creationId xmlns:p14="http://schemas.microsoft.com/office/powerpoint/2010/main" val="2312658499"/>
       </p:ext>
     </p:extLst>
   </p:cSld>
@@ -3711,15 +4139,7 @@
             </a:pPr>
             <a:r>
               <a:rPr lang="es-AR" sz="3200" dirty="0" smtClean="0"/>
-              <a:t>Compartir película en </a:t>
-            </a:r>
-            <a:r>
-              <a:rPr lang="es-AR" sz="3200" dirty="0" smtClean="0"/>
-              <a:t>la Red </a:t>
-            </a:r>
-            <a:r>
-              <a:rPr lang="es-AR" sz="3200" dirty="0" smtClean="0"/>
-              <a:t>Social </a:t>
+              <a:t>Compartir película en la Red Social </a:t>
             </a:r>
             <a:r>
               <a:rPr lang="es-AR" sz="3200" dirty="0" err="1" smtClean="0"/>
@@ -3729,7 +4149,6 @@
               <a:rPr lang="es-AR" sz="3200" dirty="0" smtClean="0"/>
               <a:t>.</a:t>
             </a:r>
-            <a:endParaRPr lang="es-AR" sz="3200" dirty="0" smtClean="0"/>
           </a:p>
           <a:p>
             <a:pPr>
@@ -3762,7 +4181,7 @@
     </p:spTree>
     <p:extLst>
       <p:ext uri="{BB962C8B-B14F-4D97-AF65-F5344CB8AC3E}">
-        <p14:creationId xmlns="" xmlns:p14="http://schemas.microsoft.com/office/powerpoint/2010/main" val="3938659695"/>
+        <p14:creationId xmlns:p14="http://schemas.microsoft.com/office/powerpoint/2010/main" val="3938659695"/>
       </p:ext>
     </p:extLst>
   </p:cSld>
@@ -3848,7 +4267,7 @@
         </p:nvSpPr>
         <p:spPr>
           <a:xfrm>
-            <a:off x="2106187" y="1745674"/>
+            <a:off x="2063353" y="1745674"/>
             <a:ext cx="8065294" cy="4174836"/>
           </a:xfrm>
         </p:spPr>
@@ -3924,7 +4343,11 @@
             </a:pPr>
             <a:r>
               <a:rPr lang="es-AR" sz="3200" dirty="0" smtClean="0"/>
-              <a:t>Cargar información de complejos.</a:t>
+              <a:t>Carga de </a:t>
+            </a:r>
+            <a:r>
+              <a:rPr lang="es-AR" sz="3200" dirty="0" smtClean="0"/>
+              <a:t>información de complejos.</a:t>
             </a:r>
           </a:p>
         </p:txBody>
@@ -3932,7 +4355,7 @@
     </p:spTree>
     <p:extLst>
       <p:ext uri="{BB962C8B-B14F-4D97-AF65-F5344CB8AC3E}">
-        <p14:creationId xmlns="" xmlns:p14="http://schemas.microsoft.com/office/powerpoint/2010/main" val="1116826974"/>
+        <p14:creationId xmlns:p14="http://schemas.microsoft.com/office/powerpoint/2010/main" val="1116826974"/>
       </p:ext>
     </p:extLst>
   </p:cSld>
@@ -4029,10 +4452,33 @@
           </a:p>
         </p:txBody>
       </p:sp>
+      <p:pic>
+        <p:nvPicPr>
+          <p:cNvPr id="3" name="Picture 2"/>
+          <p:cNvPicPr>
+            <a:picLocks noChangeAspect="1"/>
+          </p:cNvPicPr>
+          <p:nvPr/>
+        </p:nvPicPr>
+        <p:blipFill rotWithShape="1">
+          <a:blip r:embed="rId2"/>
+          <a:srcRect l="2481" t="16409" r="2115" b="9002"/>
+          <a:stretch/>
+        </p:blipFill>
+        <p:spPr>
+          <a:xfrm>
+            <a:off x="816319" y="1554118"/>
+            <a:ext cx="10781463" cy="4739106"/>
+          </a:xfrm>
+          <a:prstGeom prst="rect">
+            <a:avLst/>
+          </a:prstGeom>
+        </p:spPr>
+      </p:pic>
     </p:spTree>
     <p:extLst>
       <p:ext uri="{BB962C8B-B14F-4D97-AF65-F5344CB8AC3E}">
-        <p14:creationId xmlns="" xmlns:p14="http://schemas.microsoft.com/office/powerpoint/2010/main" val="3428840923"/>
+        <p14:creationId xmlns:p14="http://schemas.microsoft.com/office/powerpoint/2010/main" val="3428840923"/>
       </p:ext>
     </p:extLst>
   </p:cSld>
@@ -4090,161 +4536,99 @@
           <a:p>
             <a:pPr algn="ctr"/>
             <a:r>
-              <a:rPr lang="en-US" dirty="0" smtClean="0"/>
-              <a:t>Control de </a:t>
-            </a:r>
-            <a:r>
               <a:rPr lang="en-US" dirty="0" err="1" smtClean="0"/>
-              <a:t>Estimación</a:t>
-            </a:r>
-            <a:r>
-              <a:rPr lang="en-US" dirty="0" smtClean="0"/>
-              <a:t>.</a:t>
-            </a:r>
-            <a:endParaRPr lang="es-AR" sz="3600" i="1" dirty="0"/>
-          </a:p>
-        </p:txBody>
-      </p:sp>
-      <p:sp>
-        <p:nvSpPr>
-          <p:cNvPr id="3" name="2 Marcador de contenido"/>
-          <p:cNvSpPr>
-            <a:spLocks noGrp="1"/>
-          </p:cNvSpPr>
-          <p:nvPr>
-            <p:ph idx="1"/>
-          </p:nvPr>
+              <a:t>Cartelera</a:t>
+            </a:r>
+            <a:endParaRPr lang="es-AR" dirty="0"/>
+          </a:p>
+        </p:txBody>
+      </p:sp>
+      <p:sp>
+        <p:nvSpPr>
+          <p:cNvPr id="6" name="5 CuadroTexto"/>
+          <p:cNvSpPr txBox="1"/>
+          <p:nvPr/>
         </p:nvSpPr>
         <p:spPr>
           <a:xfrm>
-            <a:off x="2106187" y="1745674"/>
-            <a:ext cx="8065294" cy="4174836"/>
-          </a:xfrm>
-        </p:spPr>
-        <p:txBody>
-          <a:bodyPr>
-            <a:noAutofit/>
+            <a:off x="7014755" y="1245324"/>
+            <a:ext cx="3718560" cy="1815882"/>
+          </a:xfrm>
+          <a:prstGeom prst="rect">
+            <a:avLst/>
+          </a:prstGeom>
+          <a:noFill/>
+        </p:spPr>
+        <p:txBody>
+          <a:bodyPr wrap="square" rtlCol="0">
+            <a:spAutoFit/>
           </a:bodyPr>
           <a:lstStyle/>
           <a:p>
-            <a:pPr marL="0" indent="0">
-              <a:buClr>
-                <a:srgbClr val="00B050"/>
-              </a:buClr>
-              <a:buNone/>
-            </a:pPr>
-            <a:r>
-              <a:rPr lang="es-AR" sz="3200" dirty="0" smtClean="0">
-                <a:solidFill>
-                  <a:srgbClr val="00B050"/>
-                </a:solidFill>
-              </a:rPr>
-              <a:t>Puntos Estimados:</a:t>
-            </a:r>
-            <a:r>
-              <a:rPr lang="es-AR" sz="3200" dirty="0" smtClean="0"/>
-              <a:t> 76</a:t>
-            </a:r>
-          </a:p>
-          <a:p>
-            <a:pPr marL="0" indent="0">
-              <a:buClr>
-                <a:srgbClr val="00B050"/>
-              </a:buClr>
-              <a:buNone/>
-            </a:pPr>
-            <a:r>
-              <a:rPr lang="es-AR" i="1" dirty="0" smtClean="0"/>
-              <a:t>(Equivalencia Puntos-Horas: 1 punto ≈ 2 horas</a:t>
-            </a:r>
-            <a:r>
-              <a:rPr lang="es-AR" i="1" dirty="0" smtClean="0"/>
-              <a:t>)</a:t>
-            </a:r>
-            <a:endParaRPr lang="es-AR" sz="3200" i="1" dirty="0"/>
-          </a:p>
-          <a:p>
-            <a:pPr marL="0" indent="0">
-              <a:buClr>
-                <a:srgbClr val="00B050"/>
-              </a:buClr>
-              <a:buNone/>
-            </a:pPr>
-            <a:r>
-              <a:rPr lang="es-AR" sz="3200" dirty="0" smtClean="0">
-                <a:solidFill>
-                  <a:srgbClr val="00B050"/>
-                </a:solidFill>
-              </a:rPr>
-              <a:t>Horas Aproximadas Estimadas:</a:t>
-            </a:r>
-            <a:r>
-              <a:rPr lang="es-AR" sz="3200" dirty="0" smtClean="0"/>
-              <a:t> </a:t>
-            </a:r>
-            <a:r>
-              <a:rPr lang="es-AR" sz="3200" i="1" dirty="0" smtClean="0"/>
-              <a:t>≈ [114 -152] hs</a:t>
-            </a:r>
-            <a:r>
-              <a:rPr lang="es-AR" sz="3200" i="1" dirty="0" smtClean="0"/>
-              <a:t>.</a:t>
-            </a:r>
-            <a:endParaRPr lang="es-AR" sz="2600" dirty="0" smtClean="0"/>
-          </a:p>
-          <a:p>
-            <a:pPr marL="0" indent="0">
-              <a:buClr>
-                <a:srgbClr val="00B050"/>
-              </a:buClr>
-              <a:buNone/>
-            </a:pPr>
-            <a:r>
-              <a:rPr lang="es-AR" sz="3200" dirty="0" smtClean="0">
-                <a:solidFill>
-                  <a:srgbClr val="00B050"/>
-                </a:solidFill>
-              </a:rPr>
-              <a:t>Horas Reales Cargadas</a:t>
-            </a:r>
-            <a:r>
-              <a:rPr lang="es-AR" sz="3200" dirty="0" smtClean="0">
-                <a:solidFill>
-                  <a:srgbClr val="00B050"/>
-                </a:solidFill>
-              </a:rPr>
-              <a:t>:</a:t>
-            </a:r>
-            <a:endParaRPr lang="es-AR" sz="3200" dirty="0" smtClean="0"/>
-          </a:p>
-          <a:p>
-            <a:pPr marL="0" indent="0">
-              <a:buClr>
-                <a:srgbClr val="00B050"/>
-              </a:buClr>
-              <a:buNone/>
-            </a:pPr>
-            <a:endParaRPr lang="es-AR" sz="3200" dirty="0" smtClean="0"/>
-          </a:p>
-          <a:p>
-            <a:pPr marL="0" indent="0">
-              <a:buClr>
-                <a:srgbClr val="00B050"/>
-              </a:buClr>
-              <a:buNone/>
-            </a:pPr>
-            <a:r>
-              <a:rPr lang="es-AR" sz="3200" dirty="0" smtClean="0"/>
-              <a:t>Ver archivos adjuntos de métricas</a:t>
-            </a:r>
-            <a:endParaRPr lang="es-AR" sz="3200" dirty="0" smtClean="0"/>
-          </a:p>
-        </p:txBody>
-      </p:sp>
+            <a:r>
+              <a:rPr lang="es-AR" sz="2800" dirty="0" smtClean="0"/>
+              <a:t>Desde la semana anterior a esta semana no hubieron cambios en estas pantallas.</a:t>
+            </a:r>
+            <a:endParaRPr lang="es-AR" sz="2800" dirty="0"/>
+          </a:p>
+        </p:txBody>
+      </p:sp>
+      <p:pic>
+        <p:nvPicPr>
+          <p:cNvPr id="1026" name="Picture 2" descr="C:\Users\MATIAS\Desktop\Screenshot_2013-10-09-20-49-44.png"/>
+          <p:cNvPicPr>
+            <a:picLocks noChangeAspect="1" noChangeArrowheads="1"/>
+          </p:cNvPicPr>
+          <p:nvPr/>
+        </p:nvPicPr>
+        <p:blipFill>
+          <a:blip r:embed="rId2"/>
+          <a:srcRect/>
+          <a:stretch>
+            <a:fillRect/>
+          </a:stretch>
+        </p:blipFill>
+        <p:spPr bwMode="auto">
+          <a:xfrm>
+            <a:off x="391886" y="1228876"/>
+            <a:ext cx="3080657" cy="5476724"/>
+          </a:xfrm>
+          <a:prstGeom prst="rect">
+            <a:avLst/>
+          </a:prstGeom>
+          <a:noFill/>
+        </p:spPr>
+      </p:pic>
+      <p:pic>
+        <p:nvPicPr>
+          <p:cNvPr id="1027" name="Picture 3" descr="C:\Users\MATIAS\Desktop\Screenshot_2013-10-09-20-50-05.png"/>
+          <p:cNvPicPr>
+            <a:picLocks noChangeAspect="1" noChangeArrowheads="1"/>
+          </p:cNvPicPr>
+          <p:nvPr/>
+        </p:nvPicPr>
+        <p:blipFill>
+          <a:blip r:embed="rId3"/>
+          <a:srcRect/>
+          <a:stretch>
+            <a:fillRect/>
+          </a:stretch>
+        </p:blipFill>
+        <p:spPr bwMode="auto">
+          <a:xfrm>
+            <a:off x="3777796" y="1240972"/>
+            <a:ext cx="3086099" cy="5486399"/>
+          </a:xfrm>
+          <a:prstGeom prst="rect">
+            <a:avLst/>
+          </a:prstGeom>
+          <a:noFill/>
+        </p:spPr>
+      </p:pic>
     </p:spTree>
     <p:extLst>
       <p:ext uri="{BB962C8B-B14F-4D97-AF65-F5344CB8AC3E}">
-        <p14:creationId xmlns="" xmlns:p14="http://schemas.microsoft.com/office/powerpoint/2010/main" val="1710017434"/>
+        <p14:creationId xmlns:p14="http://schemas.microsoft.com/office/powerpoint/2010/main" val="461740777"/>
       </p:ext>
     </p:extLst>
   </p:cSld>
@@ -4303,9 +4687,9 @@
             <a:pPr algn="ctr"/>
             <a:r>
               <a:rPr lang="en-US" dirty="0" err="1" smtClean="0"/>
-              <a:t>Cartelera</a:t>
-            </a:r>
-            <a:endParaRPr lang="es-AR" dirty="0"/>
+              <a:t>Funciones</a:t>
+            </a:r>
+            <a:endParaRPr lang="es-AR" sz="3600" i="1" dirty="0"/>
           </a:p>
         </p:txBody>
       </p:sp>
@@ -4317,8 +4701,8 @@
         </p:nvSpPr>
         <p:spPr>
           <a:xfrm>
-            <a:off x="7014755" y="1245324"/>
-            <a:ext cx="3718560" cy="1815882"/>
+            <a:off x="7014754" y="1245324"/>
+            <a:ext cx="4754880" cy="3539430"/>
           </a:xfrm>
           <a:prstGeom prst="rect">
             <a:avLst/>
@@ -4333,7 +4717,24 @@
           <a:p>
             <a:r>
               <a:rPr lang="es-AR" sz="2800" dirty="0" smtClean="0"/>
-              <a:t>Desde la semana anterior a esta semana no hubieron cambios en estas pantallas.</a:t>
+              <a:t>En esta pantalla, en relación a la semana pasada, aparece el botón de compartir en </a:t>
+            </a:r>
+            <a:r>
+              <a:rPr lang="es-AR" sz="2800" dirty="0" err="1" smtClean="0"/>
+              <a:t>Twitter</a:t>
+            </a:r>
+            <a:r>
+              <a:rPr lang="es-AR" sz="2800" dirty="0" smtClean="0"/>
+              <a:t>.</a:t>
+            </a:r>
+          </a:p>
+          <a:p>
+            <a:endParaRPr lang="es-AR" sz="2800" dirty="0" smtClean="0"/>
+          </a:p>
+          <a:p>
+            <a:r>
+              <a:rPr lang="es-AR" sz="2800" dirty="0" smtClean="0"/>
+              <a:t>Como se hablo con el cliente, el mismo aparece en la barra de acción a la derecha de la misma.</a:t>
             </a:r>
             <a:endParaRPr lang="es-AR" sz="2800" dirty="0"/>
           </a:p>
@@ -4341,7 +4742,7 @@
       </p:sp>
       <p:pic>
         <p:nvPicPr>
-          <p:cNvPr id="1026" name="Picture 2" descr="C:\Users\MATIAS\Desktop\Screenshot_2013-10-09-20-49-44.png"/>
+          <p:cNvPr id="1026" name="Picture 2" descr="C:\Users\MATIAS\Desktop\Nueva carpeta (2)\Screenshot_2013-10-14-18-41-40.png"/>
           <p:cNvPicPr>
             <a:picLocks noChangeAspect="1" noChangeArrowheads="1"/>
           </p:cNvPicPr>
@@ -4356,8 +4757,8 @@
         </p:blipFill>
         <p:spPr bwMode="auto">
           <a:xfrm>
-            <a:off x="391886" y="1228876"/>
-            <a:ext cx="3080657" cy="5476724"/>
+            <a:off x="250371" y="1197429"/>
+            <a:ext cx="3104468" cy="5519056"/>
           </a:xfrm>
           <a:prstGeom prst="rect">
             <a:avLst/>
@@ -4367,7 +4768,7 @@
       </p:pic>
       <p:pic>
         <p:nvPicPr>
-          <p:cNvPr id="1027" name="Picture 3" descr="C:\Users\MATIAS\Desktop\Screenshot_2013-10-09-20-50-05.png"/>
+          <p:cNvPr id="1027" name="Picture 3" descr="C:\Users\MATIAS\Desktop\Nueva carpeta (2)\Screenshot_2013-10-14-18-41-57.png"/>
           <p:cNvPicPr>
             <a:picLocks noChangeAspect="1" noChangeArrowheads="1"/>
           </p:cNvPicPr>
@@ -4382,8 +4783,8 @@
         </p:blipFill>
         <p:spPr bwMode="auto">
           <a:xfrm>
-            <a:off x="3777796" y="1240972"/>
-            <a:ext cx="3086099" cy="5486399"/>
+            <a:off x="3635149" y="1197429"/>
+            <a:ext cx="3104469" cy="5519057"/>
           </a:xfrm>
           <a:prstGeom prst="rect">
             <a:avLst/>
@@ -4394,7 +4795,7 @@
     </p:spTree>
     <p:extLst>
       <p:ext uri="{BB962C8B-B14F-4D97-AF65-F5344CB8AC3E}">
-        <p14:creationId xmlns="" xmlns:p14="http://schemas.microsoft.com/office/powerpoint/2010/main" val="461740777"/>
+        <p14:creationId xmlns:p14="http://schemas.microsoft.com/office/powerpoint/2010/main" val="461740777"/>
       </p:ext>
     </p:extLst>
   </p:cSld>
@@ -4453,7 +4854,7 @@
             <a:pPr algn="ctr"/>
             <a:r>
               <a:rPr lang="en-US" dirty="0" err="1" smtClean="0"/>
-              <a:t>Funciones</a:t>
+              <a:t>Complejos</a:t>
             </a:r>
             <a:endParaRPr lang="es-AR" sz="3600" i="1" dirty="0"/>
           </a:p>
@@ -4468,7 +4869,7 @@
         <p:spPr>
           <a:xfrm>
             <a:off x="7014754" y="1245324"/>
-            <a:ext cx="4754880" cy="3539430"/>
+            <a:ext cx="3598817" cy="2246769"/>
           </a:xfrm>
           <a:prstGeom prst="rect">
             <a:avLst/>
@@ -4483,24 +4884,15 @@
           <a:p>
             <a:r>
               <a:rPr lang="es-AR" sz="2800" dirty="0" smtClean="0"/>
-              <a:t>En esta pantalla, en relación a la semana pasada, aparece el botón de compartir en </a:t>
+              <a:t>En estas pantallas, solo aparece el Botón de compartir en </a:t>
             </a:r>
             <a:r>
               <a:rPr lang="es-AR" sz="2800" dirty="0" err="1" smtClean="0"/>
-              <a:t>Twitter</a:t>
+              <a:t>twitter</a:t>
             </a:r>
             <a:r>
               <a:rPr lang="es-AR" sz="2800" dirty="0" smtClean="0"/>
-              <a:t>.</a:t>
-            </a:r>
-          </a:p>
-          <a:p>
-            <a:endParaRPr lang="es-AR" sz="2800" dirty="0" smtClean="0"/>
-          </a:p>
-          <a:p>
-            <a:r>
-              <a:rPr lang="es-AR" sz="2800" dirty="0" smtClean="0"/>
-              <a:t>Como se hablo con el cliente, el mismo aparece en la barra de acción a la derecha de la misma.</a:t>
+              <a:t> en el ventana del detalle del complejo.</a:t>
             </a:r>
             <a:endParaRPr lang="es-AR" sz="2800" dirty="0"/>
           </a:p>
@@ -4508,7 +4900,7 @@
       </p:sp>
       <p:pic>
         <p:nvPicPr>
-          <p:cNvPr id="1026" name="Picture 2" descr="C:\Users\MATIAS\Desktop\Nueva carpeta (2)\Screenshot_2013-10-14-18-41-40.png"/>
+          <p:cNvPr id="3074" name="Picture 2" descr="C:\Users\MATIAS\Desktop\Screenshot_2013-10-09-20-50-36.png"/>
           <p:cNvPicPr>
             <a:picLocks noChangeAspect="1" noChangeArrowheads="1"/>
           </p:cNvPicPr>
@@ -4523,8 +4915,8 @@
         </p:blipFill>
         <p:spPr bwMode="auto">
           <a:xfrm>
-            <a:off x="250371" y="1197429"/>
-            <a:ext cx="3104468" cy="5519056"/>
+            <a:off x="468085" y="1233713"/>
+            <a:ext cx="3080657" cy="5476724"/>
           </a:xfrm>
           <a:prstGeom prst="rect">
             <a:avLst/>
@@ -4534,7 +4926,7 @@
       </p:pic>
       <p:pic>
         <p:nvPicPr>
-          <p:cNvPr id="1027" name="Picture 3" descr="C:\Users\MATIAS\Desktop\Nueva carpeta (2)\Screenshot_2013-10-14-18-41-57.png"/>
+          <p:cNvPr id="2050" name="Picture 2" descr="C:\Users\MATIAS\Desktop\Nueva carpeta (2)\Screenshot_2013-10-14-18-40-51.png"/>
           <p:cNvPicPr>
             <a:picLocks noChangeAspect="1" noChangeArrowheads="1"/>
           </p:cNvPicPr>
@@ -4549,8 +4941,8 @@
         </p:blipFill>
         <p:spPr bwMode="auto">
           <a:xfrm>
-            <a:off x="3635149" y="1197429"/>
-            <a:ext cx="3104469" cy="5519057"/>
+            <a:off x="3765026" y="1219200"/>
+            <a:ext cx="3079976" cy="5475514"/>
           </a:xfrm>
           <a:prstGeom prst="rect">
             <a:avLst/>
@@ -4561,7 +4953,7 @@
     </p:spTree>
     <p:extLst>
       <p:ext uri="{BB962C8B-B14F-4D97-AF65-F5344CB8AC3E}">
-        <p14:creationId xmlns="" xmlns:p14="http://schemas.microsoft.com/office/powerpoint/2010/main" val="461740777"/>
+        <p14:creationId xmlns:p14="http://schemas.microsoft.com/office/powerpoint/2010/main" val="461740777"/>
       </p:ext>
     </p:extLst>
   </p:cSld>
@@ -4620,7 +5012,11 @@
             <a:pPr algn="ctr"/>
             <a:r>
               <a:rPr lang="en-US" dirty="0" err="1" smtClean="0"/>
-              <a:t>Complejos</a:t>
+              <a:t>Compartir</a:t>
+            </a:r>
+            <a:r>
+              <a:rPr lang="en-US" dirty="0" smtClean="0"/>
+              <a:t> en Twitter</a:t>
             </a:r>
             <a:endParaRPr lang="es-AR" sz="3600" i="1" dirty="0"/>
           </a:p>
@@ -4635,7 +5031,7 @@
         <p:spPr>
           <a:xfrm>
             <a:off x="7014754" y="1245324"/>
-            <a:ext cx="3598817" cy="2246769"/>
+            <a:ext cx="4754880" cy="5262979"/>
           </a:xfrm>
           <a:prstGeom prst="rect">
             <a:avLst/>
@@ -4650,15 +5046,32 @@
           <a:p>
             <a:r>
               <a:rPr lang="es-AR" sz="2800" dirty="0" smtClean="0"/>
-              <a:t>En estas pantallas, solo aparece el Botón de compartir en </a:t>
+              <a:t>Como podemos ver, estas son las pantallas que se lanzan al compartir por </a:t>
             </a:r>
             <a:r>
               <a:rPr lang="es-AR" sz="2800" dirty="0" err="1" smtClean="0"/>
-              <a:t>twitter</a:t>
+              <a:t>Twitter</a:t>
             </a:r>
             <a:r>
               <a:rPr lang="es-AR" sz="2800" dirty="0" smtClean="0"/>
-              <a:t> en el ventana del detalle del complejo.</a:t>
+              <a:t> si el usuario tiene la aplicación de </a:t>
+            </a:r>
+            <a:r>
+              <a:rPr lang="es-AR" sz="2800" dirty="0" err="1" smtClean="0"/>
+              <a:t>Twitter</a:t>
+            </a:r>
+            <a:r>
+              <a:rPr lang="es-AR" sz="2800" dirty="0" smtClean="0"/>
+              <a:t> instalada en su dispositivo. En caso contrario se compartirá a través del explorador.</a:t>
+            </a:r>
+          </a:p>
+          <a:p>
+            <a:endParaRPr lang="es-AR" sz="2800" dirty="0" smtClean="0"/>
+          </a:p>
+          <a:p>
+            <a:r>
+              <a:rPr lang="es-AR" sz="2800" dirty="0" smtClean="0"/>
+              <a:t>Los mensajes son de prueba ya que no fueron establecidos por el cliente.</a:t>
             </a:r>
             <a:endParaRPr lang="es-AR" sz="2800" dirty="0"/>
           </a:p>
@@ -4666,7 +5079,7 @@
       </p:sp>
       <p:pic>
         <p:nvPicPr>
-          <p:cNvPr id="3074" name="Picture 2" descr="C:\Users\MATIAS\Desktop\Screenshot_2013-10-09-20-50-36.png"/>
+          <p:cNvPr id="3075" name="Picture 3" descr="C:\Users\MATIAS\Desktop\Nueva carpeta (2)\Screenshot_2013-10-14-18-41-47.png"/>
           <p:cNvPicPr>
             <a:picLocks noChangeAspect="1" noChangeArrowheads="1"/>
           </p:cNvPicPr>
@@ -4681,8 +5094,8 @@
         </p:blipFill>
         <p:spPr bwMode="auto">
           <a:xfrm>
-            <a:off x="468085" y="1233713"/>
-            <a:ext cx="3080657" cy="5476724"/>
+            <a:off x="455158" y="1175658"/>
+            <a:ext cx="3104469" cy="5519055"/>
           </a:xfrm>
           <a:prstGeom prst="rect">
             <a:avLst/>
@@ -4692,7 +5105,7 @@
       </p:pic>
       <p:pic>
         <p:nvPicPr>
-          <p:cNvPr id="2050" name="Picture 2" descr="C:\Users\MATIAS\Desktop\Nueva carpeta (2)\Screenshot_2013-10-14-18-40-51.png"/>
+          <p:cNvPr id="3076" name="Picture 4" descr="C:\Users\MATIAS\Desktop\Nueva carpeta (2)\Screenshot_2013-10-14-18-40-56.png"/>
           <p:cNvPicPr>
             <a:picLocks noChangeAspect="1" noChangeArrowheads="1"/>
           </p:cNvPicPr>
@@ -4707,8 +5120,8 @@
         </p:blipFill>
         <p:spPr bwMode="auto">
           <a:xfrm>
-            <a:off x="3765026" y="1219200"/>
-            <a:ext cx="3079976" cy="5475514"/>
+            <a:off x="3745139" y="1175657"/>
+            <a:ext cx="3098346" cy="5508172"/>
           </a:xfrm>
           <a:prstGeom prst="rect">
             <a:avLst/>
@@ -4719,7 +5132,7 @@
     </p:spTree>
     <p:extLst>
       <p:ext uri="{BB962C8B-B14F-4D97-AF65-F5344CB8AC3E}">
-        <p14:creationId xmlns="" xmlns:p14="http://schemas.microsoft.com/office/powerpoint/2010/main" val="461740777"/>
+        <p14:creationId xmlns:p14="http://schemas.microsoft.com/office/powerpoint/2010/main" val="461740777"/>
       </p:ext>
     </p:extLst>
   </p:cSld>
@@ -4778,31 +5191,145 @@
             <a:pPr algn="ctr"/>
             <a:r>
               <a:rPr lang="en-US" dirty="0" err="1" smtClean="0"/>
-              <a:t>Compartir</a:t>
+              <a:t>Listar</a:t>
             </a:r>
             <a:r>
               <a:rPr lang="en-US" dirty="0" smtClean="0"/>
-              <a:t> en Twitter</a:t>
+              <a:t> </a:t>
+            </a:r>
+            <a:r>
+              <a:rPr lang="en-US" dirty="0" err="1" smtClean="0"/>
+              <a:t>Funciones</a:t>
             </a:r>
             <a:endParaRPr lang="es-AR" sz="3600" i="1" dirty="0"/>
           </a:p>
         </p:txBody>
       </p:sp>
-      <p:sp>
-        <p:nvSpPr>
-          <p:cNvPr id="6" name="5 CuadroTexto"/>
+      <p:pic>
+        <p:nvPicPr>
+          <p:cNvPr id="3" name="Picture 2"/>
+          <p:cNvPicPr>
+            <a:picLocks noChangeAspect="1"/>
+          </p:cNvPicPr>
+          <p:nvPr/>
+        </p:nvPicPr>
+        <p:blipFill rotWithShape="1">
+          <a:blip r:embed="rId2"/>
+          <a:srcRect t="13963"/>
+          <a:stretch/>
+        </p:blipFill>
+        <p:spPr>
+          <a:xfrm>
+            <a:off x="2024034" y="1353467"/>
+            <a:ext cx="8617206" cy="5289380"/>
+          </a:xfrm>
+          <a:prstGeom prst="rect">
+            <a:avLst/>
+          </a:prstGeom>
+        </p:spPr>
+      </p:pic>
+      <p:sp>
+        <p:nvSpPr>
+          <p:cNvPr id="4" name="Rounded Rectangle 3"/>
+          <p:cNvSpPr/>
+          <p:nvPr/>
+        </p:nvSpPr>
+        <p:spPr>
+          <a:xfrm>
+            <a:off x="6037729" y="5916706"/>
+            <a:ext cx="968189" cy="403412"/>
+          </a:xfrm>
+          <a:prstGeom prst="roundRect">
+            <a:avLst/>
+          </a:prstGeom>
+          <a:noFill/>
+          <a:ln w="28575">
+            <a:solidFill>
+              <a:srgbClr val="00B050"/>
+            </a:solidFill>
+          </a:ln>
+        </p:spPr>
+        <p:style>
+          <a:lnRef idx="2">
+            <a:schemeClr val="accent1">
+              <a:shade val="50000"/>
+            </a:schemeClr>
+          </a:lnRef>
+          <a:fillRef idx="1">
+            <a:schemeClr val="accent1"/>
+          </a:fillRef>
+          <a:effectRef idx="0">
+            <a:schemeClr val="accent1"/>
+          </a:effectRef>
+          <a:fontRef idx="minor">
+            <a:schemeClr val="lt1"/>
+          </a:fontRef>
+        </p:style>
+        <p:txBody>
+          <a:bodyPr rtlCol="0" anchor="ctr"/>
+          <a:lstStyle/>
+          <a:p>
+            <a:pPr algn="ctr"/>
+            <a:endParaRPr lang="es-AR"/>
+          </a:p>
+        </p:txBody>
+      </p:sp>
+      <p:cxnSp>
+        <p:nvCxnSpPr>
+          <p:cNvPr id="7" name="Straight Arrow Connector 6"/>
+          <p:cNvCxnSpPr/>
+          <p:nvPr/>
+        </p:nvCxnSpPr>
+        <p:spPr>
+          <a:xfrm flipV="1">
+            <a:off x="7059706" y="5688106"/>
+            <a:ext cx="914400" cy="457200"/>
+          </a:xfrm>
+          <a:prstGeom prst="straightConnector1">
+            <a:avLst/>
+          </a:prstGeom>
+          <a:ln w="28575">
+            <a:solidFill>
+              <a:srgbClr val="00B050"/>
+            </a:solidFill>
+            <a:tailEnd type="triangle"/>
+          </a:ln>
+        </p:spPr>
+        <p:style>
+          <a:lnRef idx="1">
+            <a:schemeClr val="accent1"/>
+          </a:lnRef>
+          <a:fillRef idx="0">
+            <a:schemeClr val="accent1"/>
+          </a:fillRef>
+          <a:effectRef idx="0">
+            <a:schemeClr val="accent1"/>
+          </a:effectRef>
+          <a:fontRef idx="minor">
+            <a:schemeClr val="tx1"/>
+          </a:fontRef>
+        </p:style>
+      </p:cxnSp>
+      <p:sp>
+        <p:nvSpPr>
+          <p:cNvPr id="8" name="TextBox 7"/>
           <p:cNvSpPr txBox="1"/>
           <p:nvPr/>
         </p:nvSpPr>
         <p:spPr>
           <a:xfrm>
-            <a:off x="7014754" y="1245324"/>
-            <a:ext cx="4754880" cy="5262979"/>
+            <a:off x="7611035" y="4679576"/>
+            <a:ext cx="5002306" cy="1477328"/>
           </a:xfrm>
           <a:prstGeom prst="rect">
             <a:avLst/>
           </a:prstGeom>
           <a:noFill/>
+          <a:ln w="28575">
+            <a:solidFill>
+              <a:srgbClr val="00B050"/>
+            </a:solidFill>
+          </a:ln>
         </p:spPr>
         <p:txBody>
           <a:bodyPr wrap="square" rtlCol="0">
@@ -4811,98 +5338,115 @@
           <a:lstStyle/>
           <a:p>
             <a:r>
-              <a:rPr lang="es-AR" sz="2800" dirty="0" smtClean="0"/>
-              <a:t>Como podemos ver, estas son las pantallas que se lanzan al compartir por </a:t>
-            </a:r>
-            <a:r>
-              <a:rPr lang="es-AR" sz="2800" dirty="0" err="1" smtClean="0"/>
-              <a:t>Twitter</a:t>
-            </a:r>
-            <a:r>
-              <a:rPr lang="es-AR" sz="2800" dirty="0" smtClean="0"/>
-              <a:t> si el usuario tiene la aplicación de </a:t>
-            </a:r>
-            <a:r>
-              <a:rPr lang="es-AR" sz="2800" dirty="0" err="1" smtClean="0"/>
-              <a:t>Twitter</a:t>
-            </a:r>
-            <a:r>
-              <a:rPr lang="es-AR" sz="2800" dirty="0" smtClean="0"/>
-              <a:t> instalada en su dispositivo. En caso contrario se compartirá a través del explorador</a:t>
-            </a:r>
-            <a:r>
-              <a:rPr lang="es-AR" sz="2800" dirty="0" smtClean="0"/>
-              <a:t>.</a:t>
-            </a:r>
-          </a:p>
-          <a:p>
-            <a:endParaRPr lang="es-AR" sz="2800" dirty="0" smtClean="0"/>
-          </a:p>
-          <a:p>
-            <a:r>
-              <a:rPr lang="es-AR" sz="2800" dirty="0" smtClean="0"/>
-              <a:t>Los mensajes son de prueba ya que no fueron establecidos por el cliente.</a:t>
-            </a:r>
-            <a:endParaRPr lang="es-AR" sz="2800" dirty="0"/>
-          </a:p>
-        </p:txBody>
-      </p:sp>
-      <p:pic>
-        <p:nvPicPr>
-          <p:cNvPr id="3075" name="Picture 3" descr="C:\Users\MATIAS\Desktop\Nueva carpeta (2)\Screenshot_2013-10-14-18-41-47.png"/>
-          <p:cNvPicPr>
-            <a:picLocks noChangeAspect="1" noChangeArrowheads="1"/>
-          </p:cNvPicPr>
-          <p:nvPr/>
-        </p:nvPicPr>
-        <p:blipFill>
-          <a:blip r:embed="rId2"/>
-          <a:srcRect/>
-          <a:stretch>
-            <a:fillRect/>
-          </a:stretch>
-        </p:blipFill>
-        <p:spPr bwMode="auto">
-          <a:xfrm>
-            <a:off x="455158" y="1175658"/>
-            <a:ext cx="3104469" cy="5519055"/>
-          </a:xfrm>
-          <a:prstGeom prst="rect">
-            <a:avLst/>
-          </a:prstGeom>
-          <a:noFill/>
-        </p:spPr>
-      </p:pic>
-      <p:pic>
-        <p:nvPicPr>
-          <p:cNvPr id="3076" name="Picture 4" descr="C:\Users\MATIAS\Desktop\Nueva carpeta (2)\Screenshot_2013-10-14-18-40-56.png"/>
-          <p:cNvPicPr>
-            <a:picLocks noChangeAspect="1" noChangeArrowheads="1"/>
-          </p:cNvPicPr>
-          <p:nvPr/>
-        </p:nvPicPr>
-        <p:blipFill>
-          <a:blip r:embed="rId3"/>
-          <a:srcRect/>
-          <a:stretch>
-            <a:fillRect/>
-          </a:stretch>
-        </p:blipFill>
-        <p:spPr bwMode="auto">
-          <a:xfrm>
-            <a:off x="3745139" y="1175657"/>
-            <a:ext cx="3098346" cy="5508172"/>
-          </a:xfrm>
-          <a:prstGeom prst="rect">
-            <a:avLst/>
-          </a:prstGeom>
-          <a:noFill/>
-        </p:spPr>
-      </p:pic>
+              <a:rPr lang="en-US" dirty="0" smtClean="0"/>
+              <a:t>De </a:t>
+            </a:r>
+            <a:r>
+              <a:rPr lang="en-US" dirty="0" err="1" smtClean="0"/>
+              <a:t>izquierda</a:t>
+            </a:r>
+            <a:r>
+              <a:rPr lang="en-US" dirty="0" smtClean="0"/>
+              <a:t> a </a:t>
+            </a:r>
+            <a:r>
+              <a:rPr lang="en-US" dirty="0" err="1" smtClean="0"/>
+              <a:t>derecha</a:t>
+            </a:r>
+            <a:r>
+              <a:rPr lang="en-US" dirty="0" smtClean="0"/>
+              <a:t>:</a:t>
+            </a:r>
+          </a:p>
+          <a:p>
+            <a:pPr marL="285750" indent="-285750">
+              <a:buFont typeface="Arial" panose="020B0604020202020204" pitchFamily="34" charset="0"/>
+              <a:buChar char="•"/>
+            </a:pPr>
+            <a:r>
+              <a:rPr lang="en-US" dirty="0" err="1" smtClean="0"/>
+              <a:t>Ver</a:t>
+            </a:r>
+            <a:r>
+              <a:rPr lang="en-US" dirty="0"/>
+              <a:t> </a:t>
+            </a:r>
+            <a:r>
+              <a:rPr lang="en-US" dirty="0" smtClean="0"/>
+              <a:t>(solo </a:t>
+            </a:r>
+            <a:r>
+              <a:rPr lang="en-US" dirty="0" err="1" smtClean="0"/>
+              <a:t>lectura</a:t>
+            </a:r>
+            <a:r>
+              <a:rPr lang="en-US" dirty="0" smtClean="0"/>
+              <a:t>)</a:t>
+            </a:r>
+          </a:p>
+          <a:p>
+            <a:pPr marL="285750" indent="-285750">
+              <a:buFont typeface="Arial" panose="020B0604020202020204" pitchFamily="34" charset="0"/>
+              <a:buChar char="•"/>
+            </a:pPr>
+            <a:r>
+              <a:rPr lang="en-US" dirty="0" err="1" smtClean="0"/>
+              <a:t>Editar</a:t>
+            </a:r>
+            <a:endParaRPr lang="en-US" dirty="0" smtClean="0"/>
+          </a:p>
+          <a:p>
+            <a:pPr marL="285750" indent="-285750">
+              <a:buFont typeface="Arial" panose="020B0604020202020204" pitchFamily="34" charset="0"/>
+              <a:buChar char="•"/>
+            </a:pPr>
+            <a:r>
+              <a:rPr lang="en-US" dirty="0" err="1" smtClean="0"/>
+              <a:t>Borrar</a:t>
+            </a:r>
+            <a:endParaRPr lang="en-US" dirty="0" smtClean="0"/>
+          </a:p>
+          <a:p>
+            <a:pPr marL="285750" indent="-285750">
+              <a:buFont typeface="Arial" panose="020B0604020202020204" pitchFamily="34" charset="0"/>
+              <a:buChar char="•"/>
+            </a:pPr>
+            <a:r>
+              <a:rPr lang="en-US" dirty="0" err="1" smtClean="0"/>
+              <a:t>Marcar</a:t>
+            </a:r>
+            <a:r>
+              <a:rPr lang="en-US" dirty="0" smtClean="0"/>
+              <a:t> </a:t>
+            </a:r>
+            <a:r>
+              <a:rPr lang="en-US" dirty="0" err="1" smtClean="0"/>
+              <a:t>como</a:t>
+            </a:r>
+            <a:r>
+              <a:rPr lang="en-US" dirty="0" smtClean="0"/>
+              <a:t> </a:t>
+            </a:r>
+            <a:r>
+              <a:rPr lang="en-US" dirty="0" err="1" smtClean="0"/>
+              <a:t>disponible</a:t>
+            </a:r>
+            <a:r>
+              <a:rPr lang="en-US" dirty="0" smtClean="0"/>
+              <a:t>/no </a:t>
+            </a:r>
+            <a:r>
+              <a:rPr lang="en-US" dirty="0" err="1" smtClean="0"/>
+              <a:t>disponible</a:t>
+            </a:r>
+            <a:endParaRPr lang="es-AR" dirty="0"/>
+          </a:p>
+        </p:txBody>
+      </p:sp>
     </p:spTree>
     <p:extLst>
       <p:ext uri="{BB962C8B-B14F-4D97-AF65-F5344CB8AC3E}">
-        <p14:creationId xmlns="" xmlns:p14="http://schemas.microsoft.com/office/powerpoint/2010/main" val="461740777"/>
+        <p14:creationId xmlns:p14="http://schemas.microsoft.com/office/powerpoint/2010/main" val="650329764"/>
       </p:ext>
     </p:extLst>
   </p:cSld>
@@ -5150,7 +5694,7 @@
   <a:extraClrSchemeLst/>
   <a:extLst>
     <a:ext uri="{05A4C25C-085E-4340-85A3-A5531E510DB2}">
-      <thm15:themeFamily xmlns="" xmlns:thm15="http://schemas.microsoft.com/office/thememl/2012/main" name="Metropolitan" id="{4C5440D6-04D2-4954-96CF-F251137069B2}" vid="{79CFCA13-9412-4290-BB4B-85112F88857B}"/>
+      <thm15:themeFamily xmlns:thm15="http://schemas.microsoft.com/office/thememl/2012/main" name="Metropolitan" id="{4C5440D6-04D2-4954-96CF-F251137069B2}" vid="{79CFCA13-9412-4290-BB4B-85112F88857B}"/>
     </a:ext>
   </a:extLst>
 </a:theme>

</xml_diff>